<commit_message>
Update flow char for implementation svgf.
</commit_message>
<xml_diff>
--- a/docs/FlowChartForSVGF.pptx
+++ b/docs/FlowChartForSVGF.pptx
@@ -6733,7 +6733,7 @@
         </p:nvSpPr>
         <p:spPr>
           <a:xfrm>
-            <a:off x="5530756" y="3366515"/>
+            <a:off x="5540816" y="5125368"/>
             <a:ext cx="1080120" cy="288032"/>
           </a:xfrm>
           <a:prstGeom prst="flowChartTerminator">
@@ -6770,14 +6770,14 @@
           <p:cNvPr id="102" name="直線矢印コネクタ 101"/>
           <p:cNvCxnSpPr>
             <a:stCxn id="97" idx="3"/>
-            <a:endCxn id="100" idx="0"/>
+            <a:endCxn id="42" idx="0"/>
           </p:cNvCxnSpPr>
           <p:nvPr/>
         </p:nvCxnSpPr>
         <p:spPr>
-          <a:xfrm flipH="1">
-            <a:off x="6070816" y="3086962"/>
-            <a:ext cx="1059" cy="279553"/>
+          <a:xfrm>
+            <a:off x="6071875" y="3086962"/>
+            <a:ext cx="9001" cy="298257"/>
           </a:xfrm>
           <a:prstGeom prst="straightConnector1">
             <a:avLst/>
@@ -7191,7 +7191,7 @@
         </p:nvSpPr>
         <p:spPr>
           <a:xfrm>
-            <a:off x="5909966" y="4926361"/>
+            <a:off x="2243992" y="5628337"/>
             <a:ext cx="2478458" cy="1094927"/>
           </a:xfrm>
           <a:prstGeom prst="rect">
@@ -7227,6 +7227,218 @@
           </a:p>
         </p:txBody>
       </p:sp>
+      <p:sp>
+        <p:nvSpPr>
+          <p:cNvPr id="41" name="正方形/長方形 40"/>
+          <p:cNvSpPr/>
+          <p:nvPr/>
+        </p:nvSpPr>
+        <p:spPr>
+          <a:xfrm>
+            <a:off x="5324792" y="4237873"/>
+            <a:ext cx="1512168" cy="585945"/>
+          </a:xfrm>
+          <a:prstGeom prst="rect">
+            <a:avLst/>
+          </a:prstGeom>
+        </p:spPr>
+        <p:style>
+          <a:lnRef idx="2">
+            <a:schemeClr val="accent1">
+              <a:shade val="50000"/>
+            </a:schemeClr>
+          </a:lnRef>
+          <a:fillRef idx="1">
+            <a:schemeClr val="accent1"/>
+          </a:fillRef>
+          <a:effectRef idx="0">
+            <a:schemeClr val="accent1"/>
+          </a:effectRef>
+          <a:fontRef idx="minor">
+            <a:schemeClr val="lt1"/>
+          </a:fontRef>
+        </p:style>
+        <p:txBody>
+          <a:bodyPr rtlCol="0" anchor="ctr"/>
+          <a:lstStyle/>
+          <a:p>
+            <a:pPr algn="ctr"/>
+            <a:r>
+              <a:rPr lang="ja-JP" altLang="en-US" sz="1400" dirty="0"/>
+              <a:t>輝度</a:t>
+            </a:r>
+            <a:r>
+              <a:rPr kumimoji="1" lang="ja-JP" altLang="en-US" sz="1400" dirty="0" smtClean="0"/>
+              <a:t>出力</a:t>
+            </a:r>
+            <a:endParaRPr kumimoji="1" lang="en-US" altLang="ja-JP" sz="1400" dirty="0" smtClean="0"/>
+          </a:p>
+          <a:p>
+            <a:pPr algn="ctr"/>
+            <a:r>
+              <a:rPr lang="ja-JP" altLang="en-US" sz="1400" dirty="0" smtClean="0"/>
+              <a:t>（</a:t>
+            </a:r>
+            <a:r>
+              <a:rPr lang="en-US" altLang="ja-JP" sz="1400" dirty="0" err="1" smtClean="0"/>
+              <a:t>TemporalFilter</a:t>
+            </a:r>
+            <a:r>
+              <a:rPr lang="ja-JP" altLang="en-US" sz="1400" dirty="0" smtClean="0"/>
+              <a:t>用</a:t>
+            </a:r>
+            <a:r>
+              <a:rPr lang="ja-JP" altLang="en-US" sz="1400" dirty="0" smtClean="0"/>
+              <a:t>）</a:t>
+            </a:r>
+            <a:endParaRPr kumimoji="1" lang="ja-JP" altLang="en-US" sz="1400" dirty="0"/>
+          </a:p>
+        </p:txBody>
+      </p:sp>
+      <p:sp>
+        <p:nvSpPr>
+          <p:cNvPr id="42" name="正方形/長方形 41"/>
+          <p:cNvSpPr/>
+          <p:nvPr/>
+        </p:nvSpPr>
+        <p:spPr>
+          <a:xfrm>
+            <a:off x="5324792" y="3385219"/>
+            <a:ext cx="1512168" cy="592293"/>
+          </a:xfrm>
+          <a:prstGeom prst="rect">
+            <a:avLst/>
+          </a:prstGeom>
+        </p:spPr>
+        <p:style>
+          <a:lnRef idx="2">
+            <a:schemeClr val="accent1">
+              <a:shade val="50000"/>
+            </a:schemeClr>
+          </a:lnRef>
+          <a:fillRef idx="1">
+            <a:schemeClr val="accent1"/>
+          </a:fillRef>
+          <a:effectRef idx="0">
+            <a:schemeClr val="accent1"/>
+          </a:effectRef>
+          <a:fontRef idx="minor">
+            <a:schemeClr val="lt1"/>
+          </a:fontRef>
+        </p:style>
+        <p:txBody>
+          <a:bodyPr rtlCol="0" anchor="ctr"/>
+          <a:lstStyle/>
+          <a:p>
+            <a:pPr algn="ctr"/>
+            <a:r>
+              <a:rPr kumimoji="1" lang="ja-JP" altLang="en-US" sz="1400" dirty="0" smtClean="0"/>
+              <a:t>輝度</a:t>
+            </a:r>
+            <a:r>
+              <a:rPr kumimoji="1" lang="en-US" altLang="ja-JP" sz="1400" dirty="0" smtClean="0"/>
+              <a:t>moment</a:t>
+            </a:r>
+            <a:r>
+              <a:rPr kumimoji="1" lang="ja-JP" altLang="en-US" sz="1400" dirty="0" smtClean="0"/>
+              <a:t>出力</a:t>
+            </a:r>
+            <a:endParaRPr kumimoji="1" lang="en-US" altLang="ja-JP" sz="1400" dirty="0" smtClean="0"/>
+          </a:p>
+          <a:p>
+            <a:pPr algn="ctr"/>
+            <a:r>
+              <a:rPr lang="ja-JP" altLang="en-US" sz="1400" dirty="0" smtClean="0"/>
+              <a:t>（</a:t>
+            </a:r>
+            <a:r>
+              <a:rPr lang="en-US" altLang="ja-JP" sz="1400" dirty="0" smtClean="0"/>
+              <a:t>A-</a:t>
+            </a:r>
+            <a:r>
+              <a:rPr lang="en-US" altLang="ja-JP" sz="1400" dirty="0" err="1" smtClean="0"/>
+              <a:t>Trous</a:t>
+            </a:r>
+            <a:r>
+              <a:rPr lang="ja-JP" altLang="en-US" sz="1400" dirty="0" smtClean="0"/>
+              <a:t>用）</a:t>
+            </a:r>
+            <a:endParaRPr kumimoji="1" lang="en-US" altLang="ja-JP" sz="1400" dirty="0" smtClean="0"/>
+          </a:p>
+        </p:txBody>
+      </p:sp>
+      <p:cxnSp>
+        <p:nvCxnSpPr>
+          <p:cNvPr id="46" name="直線矢印コネクタ 45"/>
+          <p:cNvCxnSpPr>
+            <a:stCxn id="42" idx="2"/>
+            <a:endCxn id="41" idx="0"/>
+          </p:cNvCxnSpPr>
+          <p:nvPr/>
+        </p:nvCxnSpPr>
+        <p:spPr>
+          <a:xfrm>
+            <a:off x="6080876" y="3977512"/>
+            <a:ext cx="0" cy="260361"/>
+          </a:xfrm>
+          <a:prstGeom prst="straightConnector1">
+            <a:avLst/>
+          </a:prstGeom>
+          <a:ln>
+            <a:tailEnd type="arrow"/>
+          </a:ln>
+        </p:spPr>
+        <p:style>
+          <a:lnRef idx="1">
+            <a:schemeClr val="accent1"/>
+          </a:lnRef>
+          <a:fillRef idx="0">
+            <a:schemeClr val="accent1"/>
+          </a:fillRef>
+          <a:effectRef idx="0">
+            <a:schemeClr val="accent1"/>
+          </a:effectRef>
+          <a:fontRef idx="minor">
+            <a:schemeClr val="tx1"/>
+          </a:fontRef>
+        </p:style>
+      </p:cxnSp>
+      <p:cxnSp>
+        <p:nvCxnSpPr>
+          <p:cNvPr id="52" name="直線矢印コネクタ 51"/>
+          <p:cNvCxnSpPr>
+            <a:stCxn id="41" idx="2"/>
+            <a:endCxn id="100" idx="0"/>
+          </p:cNvCxnSpPr>
+          <p:nvPr/>
+        </p:nvCxnSpPr>
+        <p:spPr>
+          <a:xfrm>
+            <a:off x="6080876" y="4823818"/>
+            <a:ext cx="0" cy="301550"/>
+          </a:xfrm>
+          <a:prstGeom prst="straightConnector1">
+            <a:avLst/>
+          </a:prstGeom>
+          <a:ln>
+            <a:tailEnd type="arrow"/>
+          </a:ln>
+        </p:spPr>
+        <p:style>
+          <a:lnRef idx="1">
+            <a:schemeClr val="accent1"/>
+          </a:lnRef>
+          <a:fillRef idx="0">
+            <a:schemeClr val="accent1"/>
+          </a:fillRef>
+          <a:effectRef idx="0">
+            <a:schemeClr val="accent1"/>
+          </a:effectRef>
+          <a:fontRef idx="minor">
+            <a:schemeClr val="tx1"/>
+          </a:fontRef>
+        </p:style>
+      </p:cxnSp>
     </p:spTree>
     <p:extLst>
       <p:ext uri="{BB962C8B-B14F-4D97-AF65-F5344CB8AC3E}">
@@ -7549,7 +7761,7 @@
         </p:nvSpPr>
         <p:spPr>
           <a:xfrm>
-            <a:off x="791580" y="4005064"/>
+            <a:off x="791580" y="3429000"/>
             <a:ext cx="1512168" cy="585945"/>
           </a:xfrm>
           <a:prstGeom prst="rect">
@@ -7606,13 +7818,13 @@
       </p:sp>
       <p:sp>
         <p:nvSpPr>
-          <p:cNvPr id="11" name="正方形/長方形 10"/>
+          <p:cNvPr id="12" name="正方形/長方形 11"/>
           <p:cNvSpPr/>
           <p:nvPr/>
         </p:nvSpPr>
         <p:spPr>
           <a:xfrm>
-            <a:off x="791580" y="5723375"/>
+            <a:off x="791580" y="4306874"/>
             <a:ext cx="1512168" cy="585945"/>
           </a:xfrm>
           <a:prstGeom prst="rect">
@@ -7641,12 +7853,8 @@
           <a:p>
             <a:pPr algn="ctr"/>
             <a:r>
-              <a:rPr lang="ja-JP" altLang="en-US" sz="1400" dirty="0"/>
-              <a:t>輝度</a:t>
-            </a:r>
-            <a:r>
               <a:rPr kumimoji="1" lang="ja-JP" altLang="en-US" sz="1400" dirty="0" smtClean="0"/>
-              <a:t>出力</a:t>
+              <a:t>テクスチャカラー出力</a:t>
             </a:r>
             <a:endParaRPr kumimoji="1" lang="en-US" altLang="ja-JP" sz="1400" dirty="0" smtClean="0"/>
           </a:p>
@@ -7657,77 +7865,13 @@
               <a:t>（</a:t>
             </a:r>
             <a:r>
-              <a:rPr lang="en-US" altLang="ja-JP" sz="1400" dirty="0" err="1" smtClean="0"/>
-              <a:t>TemporalFilter</a:t>
-            </a:r>
-            <a:r>
-              <a:rPr lang="ja-JP" altLang="en-US" sz="1400" dirty="0" smtClean="0"/>
-              <a:t>用</a:t>
+              <a:rPr lang="en-US" altLang="ja-JP" sz="1400" dirty="0" smtClean="0"/>
+              <a:t>Albedo</a:t>
             </a:r>
             <a:r>
               <a:rPr lang="ja-JP" altLang="en-US" sz="1400" dirty="0" smtClean="0"/>
               <a:t>）</a:t>
             </a:r>
-            <a:endParaRPr kumimoji="1" lang="ja-JP" altLang="en-US" sz="1400" dirty="0"/>
-          </a:p>
-        </p:txBody>
-      </p:sp>
-      <p:sp>
-        <p:nvSpPr>
-          <p:cNvPr id="12" name="正方形/長方形 11"/>
-          <p:cNvSpPr/>
-          <p:nvPr/>
-        </p:nvSpPr>
-        <p:spPr>
-          <a:xfrm>
-            <a:off x="791580" y="4882938"/>
-            <a:ext cx="1512168" cy="585945"/>
-          </a:xfrm>
-          <a:prstGeom prst="rect">
-            <a:avLst/>
-          </a:prstGeom>
-        </p:spPr>
-        <p:style>
-          <a:lnRef idx="2">
-            <a:schemeClr val="accent1">
-              <a:shade val="50000"/>
-            </a:schemeClr>
-          </a:lnRef>
-          <a:fillRef idx="1">
-            <a:schemeClr val="accent1"/>
-          </a:fillRef>
-          <a:effectRef idx="0">
-            <a:schemeClr val="accent1"/>
-          </a:effectRef>
-          <a:fontRef idx="minor">
-            <a:schemeClr val="lt1"/>
-          </a:fontRef>
-        </p:style>
-        <p:txBody>
-          <a:bodyPr rtlCol="0" anchor="ctr"/>
-          <a:lstStyle/>
-          <a:p>
-            <a:pPr algn="ctr"/>
-            <a:r>
-              <a:rPr kumimoji="1" lang="ja-JP" altLang="en-US" sz="1400" dirty="0" smtClean="0"/>
-              <a:t>テクスチャカラー出力</a:t>
-            </a:r>
-            <a:endParaRPr kumimoji="1" lang="en-US" altLang="ja-JP" sz="1400" dirty="0" smtClean="0"/>
-          </a:p>
-          <a:p>
-            <a:pPr algn="ctr"/>
-            <a:r>
-              <a:rPr lang="ja-JP" altLang="en-US" sz="1400" dirty="0" smtClean="0"/>
-              <a:t>（</a:t>
-            </a:r>
-            <a:r>
-              <a:rPr lang="en-US" altLang="ja-JP" sz="1400" dirty="0" smtClean="0"/>
-              <a:t>Albedo</a:t>
-            </a:r>
-            <a:r>
-              <a:rPr lang="ja-JP" altLang="en-US" sz="1400" dirty="0" smtClean="0"/>
-              <a:t>）</a:t>
-            </a:r>
             <a:endParaRPr kumimoji="1" lang="en-US" altLang="ja-JP" sz="1400" dirty="0" smtClean="0"/>
           </a:p>
         </p:txBody>
@@ -7740,7 +7884,7 @@
         </p:nvSpPr>
         <p:spPr>
           <a:xfrm>
-            <a:off x="1007604" y="6453336"/>
+            <a:off x="1007604" y="5147311"/>
             <a:ext cx="1080120" cy="288032"/>
           </a:xfrm>
           <a:prstGeom prst="flowChartTerminator">
@@ -7918,42 +8062,6 @@
       </p:cxnSp>
       <p:cxnSp>
         <p:nvCxnSpPr>
-          <p:cNvPr id="23" name="直線矢印コネクタ 22"/>
-          <p:cNvCxnSpPr>
-            <a:stCxn id="22" idx="2"/>
-            <a:endCxn id="10" idx="0"/>
-          </p:cNvCxnSpPr>
-          <p:nvPr/>
-        </p:nvCxnSpPr>
-        <p:spPr>
-          <a:xfrm>
-            <a:off x="1547664" y="3740197"/>
-            <a:ext cx="0" cy="264867"/>
-          </a:xfrm>
-          <a:prstGeom prst="straightConnector1">
-            <a:avLst/>
-          </a:prstGeom>
-          <a:ln>
-            <a:tailEnd type="arrow"/>
-          </a:ln>
-        </p:spPr>
-        <p:style>
-          <a:lnRef idx="1">
-            <a:schemeClr val="accent1"/>
-          </a:lnRef>
-          <a:fillRef idx="0">
-            <a:schemeClr val="accent1"/>
-          </a:fillRef>
-          <a:effectRef idx="0">
-            <a:schemeClr val="accent1"/>
-          </a:effectRef>
-          <a:fontRef idx="minor">
-            <a:schemeClr val="tx1"/>
-          </a:fontRef>
-        </p:style>
-      </p:cxnSp>
-      <p:cxnSp>
-        <p:nvCxnSpPr>
           <p:cNvPr id="25" name="直線矢印コネクタ 24"/>
           <p:cNvCxnSpPr>
             <a:stCxn id="10" idx="2"/>
@@ -7963,7 +8071,7 @@
         </p:nvCxnSpPr>
         <p:spPr>
           <a:xfrm>
-            <a:off x="1547664" y="4591009"/>
+            <a:off x="1547664" y="4014945"/>
             <a:ext cx="0" cy="291929"/>
           </a:xfrm>
           <a:prstGeom prst="straightConnector1">
@@ -7993,50 +8101,14 @@
           <p:cNvPr id="28" name="直線矢印コネクタ 27"/>
           <p:cNvCxnSpPr>
             <a:stCxn id="12" idx="2"/>
-            <a:endCxn id="11" idx="0"/>
-          </p:cNvCxnSpPr>
-          <p:nvPr/>
-        </p:nvCxnSpPr>
-        <p:spPr>
-          <a:xfrm>
-            <a:off x="1547664" y="5468883"/>
-            <a:ext cx="0" cy="254492"/>
-          </a:xfrm>
-          <a:prstGeom prst="straightConnector1">
-            <a:avLst/>
-          </a:prstGeom>
-          <a:ln>
-            <a:tailEnd type="arrow"/>
-          </a:ln>
-        </p:spPr>
-        <p:style>
-          <a:lnRef idx="1">
-            <a:schemeClr val="accent1"/>
-          </a:lnRef>
-          <a:fillRef idx="0">
-            <a:schemeClr val="accent1"/>
-          </a:fillRef>
-          <a:effectRef idx="0">
-            <a:schemeClr val="accent1"/>
-          </a:effectRef>
-          <a:fontRef idx="minor">
-            <a:schemeClr val="tx1"/>
-          </a:fontRef>
-        </p:style>
-      </p:cxnSp>
-      <p:cxnSp>
-        <p:nvCxnSpPr>
-          <p:cNvPr id="30" name="直線矢印コネクタ 29"/>
-          <p:cNvCxnSpPr>
-            <a:stCxn id="11" idx="2"/>
             <a:endCxn id="13" idx="0"/>
           </p:cNvCxnSpPr>
           <p:nvPr/>
         </p:nvCxnSpPr>
         <p:spPr>
           <a:xfrm>
-            <a:off x="1547664" y="6309320"/>
-            <a:ext cx="0" cy="144016"/>
+            <a:off x="1547664" y="4892819"/>
+            <a:ext cx="0" cy="254492"/>
           </a:xfrm>
           <a:prstGeom prst="straightConnector1">
             <a:avLst/>
@@ -8108,58 +8180,6 @@
               <a:rPr lang="en-US" altLang="ja-JP" dirty="0" smtClean="0"/>
               <a:t>mtxW2C</a:t>
             </a:r>
-          </a:p>
-        </p:txBody>
-      </p:sp>
-      <p:sp>
-        <p:nvSpPr>
-          <p:cNvPr id="22" name="正方形/長方形 21"/>
-          <p:cNvSpPr/>
-          <p:nvPr/>
-        </p:nvSpPr>
-        <p:spPr>
-          <a:xfrm>
-            <a:off x="791580" y="3429000"/>
-            <a:ext cx="1512168" cy="311197"/>
-          </a:xfrm>
-          <a:prstGeom prst="rect">
-            <a:avLst/>
-          </a:prstGeom>
-        </p:spPr>
-        <p:style>
-          <a:lnRef idx="2">
-            <a:schemeClr val="accent1">
-              <a:shade val="50000"/>
-            </a:schemeClr>
-          </a:lnRef>
-          <a:fillRef idx="1">
-            <a:schemeClr val="accent1"/>
-          </a:fillRef>
-          <a:effectRef idx="0">
-            <a:schemeClr val="accent1"/>
-          </a:effectRef>
-          <a:fontRef idx="minor">
-            <a:schemeClr val="lt1"/>
-          </a:fontRef>
-        </p:style>
-        <p:txBody>
-          <a:bodyPr rtlCol="0" anchor="ctr"/>
-          <a:lstStyle/>
-          <a:p>
-            <a:pPr algn="ctr"/>
-            <a:r>
-              <a:rPr kumimoji="1" lang="ja-JP" altLang="en-US" sz="1400" dirty="0" smtClean="0"/>
-              <a:t>輝度</a:t>
-            </a:r>
-            <a:r>
-              <a:rPr kumimoji="1" lang="en-US" altLang="ja-JP" sz="1400" dirty="0" smtClean="0"/>
-              <a:t>moment</a:t>
-            </a:r>
-            <a:r>
-              <a:rPr kumimoji="1" lang="ja-JP" altLang="en-US" sz="1400" dirty="0" smtClean="0"/>
-              <a:t>出力</a:t>
-            </a:r>
-            <a:endParaRPr kumimoji="1" lang="en-US" altLang="ja-JP" sz="1400" dirty="0" smtClean="0"/>
           </a:p>
         </p:txBody>
       </p:sp>
@@ -8168,7 +8188,7 @@
           <p:cNvPr id="24" name="直線矢印コネクタ 23"/>
           <p:cNvCxnSpPr>
             <a:stCxn id="8" idx="2"/>
-            <a:endCxn id="22" idx="0"/>
+            <a:endCxn id="10" idx="0"/>
           </p:cNvCxnSpPr>
           <p:nvPr/>
         </p:nvCxnSpPr>

</xml_diff>